<commit_message>
BUG: pptgen fixes by @sanjay.yadav
</commit_message>
<xml_diff>
--- a/testlib/input.pptx
+++ b/testlib/input.pptx
@@ -5,10 +5,10 @@
     <p:sldMasterId id="2147483660" r:id="rId1"/>
   </p:sldMasterIdLst>
   <p:notesMasterIdLst>
-    <p:notesMasterId r:id="rId26"/>
+    <p:notesMasterId r:id="rId27"/>
   </p:notesMasterIdLst>
   <p:handoutMasterIdLst>
-    <p:handoutMasterId r:id="rId27"/>
+    <p:handoutMasterId r:id="rId28"/>
   </p:handoutMasterIdLst>
   <p:sldIdLst>
     <p:sldId id="256" r:id="rId2"/>
@@ -35,6 +35,7 @@
     <p:sldId id="277" r:id="rId23"/>
     <p:sldId id="278" r:id="rId24"/>
     <p:sldId id="279" r:id="rId25"/>
+    <p:sldId id="280" r:id="rId26"/>
   </p:sldIdLst>
   <p:sldSz cx="9144000" cy="6858000" type="screen4x3"/>
   <p:notesSz cx="6858000" cy="9144000"/>
@@ -184,6 +185,7 @@
   </mc:AlternateContent>
   <c:chart>
     <c:title>
+      <c:layout/>
       <c:overlay val="0"/>
       <c:spPr>
         <a:noFill/>
@@ -563,6 +565,7 @@
     </c:plotArea>
     <c:legend>
       <c:legendPos val="b"/>
+      <c:layout/>
       <c:overlay val="0"/>
       <c:spPr>
         <a:noFill/>
@@ -936,6 +939,7 @@
           </a:p>
         </c:rich>
       </c:tx>
+      <c:layout/>
       <c:overlay val="0"/>
       <c:spPr>
         <a:noFill/>
@@ -1315,6 +1319,7 @@
     </c:plotArea>
     <c:legend>
       <c:legendPos val="b"/>
+      <c:layout/>
       <c:overlay val="0"/>
       <c:spPr>
         <a:noFill/>
@@ -1414,7 +1419,6 @@
           </a:p>
         </c:rich>
       </c:tx>
-      <c:layout/>
       <c:overlay val="0"/>
       <c:spPr>
         <a:noFill/>
@@ -1838,7 +1842,6 @@
     </c:plotArea>
     <c:legend>
       <c:legendPos val="b"/>
-      <c:layout/>
       <c:overlay val="0"/>
       <c:spPr>
         <a:noFill/>
@@ -2353,7 +2356,6 @@
           </a:p>
         </c:rich>
       </c:tx>
-      <c:layout/>
       <c:overlay val="0"/>
       <c:spPr>
         <a:noFill/>
@@ -9641,7 +9643,7 @@
           <a:p>
             <a:fld id="{13E8670D-DACE-4106-9284-EFC2D346D8FE}" type="datetimeFigureOut">
               <a:rPr lang="en-US" smtClean="0"/>
-              <a:t>11/13/2017</a:t>
+              <a:t>11/15/2017</a:t>
             </a:fld>
             <a:endParaRPr lang="en-US" dirty="0"/>
           </a:p>
@@ -9806,7 +9808,7 @@
           <a:p>
             <a:fld id="{B55C8D6E-200A-4257-BFED-522F4EBA3D4A}" type="datetimeFigureOut">
               <a:rPr lang="en-US" smtClean="0"/>
-              <a:t>11/13/2017</a:t>
+              <a:t>11/15/2017</a:t>
             </a:fld>
             <a:endParaRPr lang="en-US" dirty="0"/>
           </a:p>
@@ -10138,7 +10140,7 @@
           <a:p>
             <a:fld id="{DE2C6F76-5EDA-4247-B34D-42592F5122A8}" type="datetime1">
               <a:rPr lang="en-US" smtClean="0"/>
-              <a:t>11/13/2017</a:t>
+              <a:t>11/15/2017</a:t>
             </a:fld>
             <a:endParaRPr lang="en-US" dirty="0"/>
           </a:p>
@@ -10338,7 +10340,7 @@
           <a:p>
             <a:fld id="{DE2C6F76-5EDA-4247-B34D-42592F5122A8}" type="datetime1">
               <a:rPr lang="en-US" smtClean="0"/>
-              <a:t>11/13/2017</a:t>
+              <a:t>11/15/2017</a:t>
             </a:fld>
             <a:endParaRPr lang="en-US" dirty="0"/>
           </a:p>
@@ -10436,7 +10438,7 @@
           <a:p>
             <a:fld id="{B325DF4A-260C-4E98-8F6D-1C9651FA5C9C}" type="datetime1">
               <a:rPr lang="en-US" smtClean="0"/>
-              <a:t>11/13/2017</a:t>
+              <a:t>11/15/2017</a:t>
             </a:fld>
             <a:endParaRPr lang="en-US" dirty="0"/>
           </a:p>
@@ -10660,7 +10662,7 @@
           <a:p>
             <a:fld id="{DE2C6F76-5EDA-4247-B34D-42592F5122A8}" type="datetime1">
               <a:rPr lang="en-US" smtClean="0"/>
-              <a:t>11/13/2017</a:t>
+              <a:t>11/15/2017</a:t>
             </a:fld>
             <a:endParaRPr lang="en-US" dirty="0"/>
           </a:p>
@@ -11020,7 +11022,7 @@
           <a:p>
             <a:fld id="{DE2C6F76-5EDA-4247-B34D-42592F5122A8}" type="datetime1">
               <a:rPr lang="en-US" smtClean="0"/>
-              <a:t>11/13/2017</a:t>
+              <a:t>11/15/2017</a:t>
             </a:fld>
             <a:endParaRPr lang="en-US" dirty="0"/>
           </a:p>
@@ -11184,7 +11186,7 @@
             <a:fld id="{33D6D1A4-82FD-416F-B454-ACF63A7912F0}" type="datetime1">
               <a:rPr lang="en-US" smtClean="0"/>
               <a:pPr/>
-              <a:t>11/13/2017</a:t>
+              <a:t>11/15/2017</a:t>
             </a:fld>
             <a:endParaRPr lang="en-US" dirty="0"/>
           </a:p>
@@ -11468,7 +11470,7 @@
             <a:fld id="{33D6D1A4-82FD-416F-B454-ACF63A7912F0}" type="datetime1">
               <a:rPr lang="en-US" smtClean="0"/>
               <a:pPr/>
-              <a:t>11/13/2017</a:t>
+              <a:t>11/15/2017</a:t>
             </a:fld>
             <a:endParaRPr lang="en-US" dirty="0"/>
           </a:p>
@@ -11814,7 +11816,7 @@
           <a:p>
             <a:fld id="{B4EA9854-C19E-4C4C-9137-0D4556CC6316}" type="datetime1">
               <a:rPr lang="en-US" smtClean="0"/>
-              <a:t>11/13/2017</a:t>
+              <a:t>11/15/2017</a:t>
             </a:fld>
             <a:endParaRPr lang="en-US" dirty="0"/>
           </a:p>
@@ -12024,7 +12026,7 @@
             <a:fld id="{33D6D1A4-82FD-416F-B454-ACF63A7912F0}" type="datetime1">
               <a:rPr lang="en-US" smtClean="0"/>
               <a:pPr/>
-              <a:t>11/13/2017</a:t>
+              <a:t>11/15/2017</a:t>
             </a:fld>
             <a:endParaRPr lang="en-US" dirty="0"/>
           </a:p>
@@ -13766,11 +13768,7 @@
             </a:r>
             <a:r>
               <a:rPr lang="en-US" dirty="0" smtClean="0"/>
-              <a:t> </a:t>
-            </a:r>
-            <a:r>
-              <a:rPr lang="en-US" dirty="0" smtClean="0"/>
-              <a:t>Test Case</a:t>
+              <a:t> Test Case</a:t>
             </a:r>
             <a:endParaRPr lang="en-IN" dirty="0"/>
           </a:p>
@@ -13863,11 +13861,7 @@
           <a:p>
             <a:r>
               <a:rPr lang="en-US" dirty="0" smtClean="0"/>
-              <a:t>Sankey </a:t>
-            </a:r>
-            <a:r>
-              <a:rPr lang="en-US" dirty="0" smtClean="0"/>
-              <a:t>Test Case</a:t>
+              <a:t>Sankey Test Case</a:t>
             </a:r>
             <a:endParaRPr lang="en-IN" dirty="0"/>
           </a:p>
@@ -13964,11 +13958,7 @@
             </a:r>
             <a:r>
               <a:rPr lang="en-US" dirty="0" smtClean="0"/>
-              <a:t> </a:t>
-            </a:r>
-            <a:r>
-              <a:rPr lang="en-US" dirty="0" smtClean="0"/>
-              <a:t>Test Case</a:t>
+              <a:t> Test Case</a:t>
             </a:r>
             <a:endParaRPr lang="en-IN" dirty="0"/>
           </a:p>
@@ -14018,6 +14008,99 @@
     <p:extLst>
       <p:ext uri="{BB962C8B-B14F-4D97-AF65-F5344CB8AC3E}">
         <p14:creationId xmlns:p14="http://schemas.microsoft.com/office/powerpoint/2010/main" val="3318003777"/>
+      </p:ext>
+    </p:extLst>
+  </p:cSld>
+  <p:clrMapOvr>
+    <a:masterClrMapping/>
+  </p:clrMapOvr>
+</p:sld>
+</file>
+
+<file path=ppt/slides/slide25.xml><?xml version="1.0" encoding="utf-8"?>
+<p:sld xmlns:a="http://schemas.openxmlformats.org/drawingml/2006/main" xmlns:r="http://schemas.openxmlformats.org/officeDocument/2006/relationships" xmlns:p="http://schemas.openxmlformats.org/presentationml/2006/main">
+  <p:cSld>
+    <p:spTree>
+      <p:nvGrpSpPr>
+        <p:cNvPr id="1" name=""/>
+        <p:cNvGrpSpPr/>
+        <p:nvPr/>
+      </p:nvGrpSpPr>
+      <p:grpSpPr>
+        <a:xfrm>
+          <a:off x="0" y="0"/>
+          <a:ext cx="0" cy="0"/>
+          <a:chOff x="0" y="0"/>
+          <a:chExt cx="0" cy="0"/>
+        </a:xfrm>
+      </p:grpSpPr>
+      <p:sp>
+        <p:nvSpPr>
+          <p:cNvPr id="3" name="Title 1"/>
+          <p:cNvSpPr>
+            <a:spLocks noGrp="1"/>
+          </p:cNvSpPr>
+          <p:nvPr>
+            <p:ph type="title"/>
+          </p:nvPr>
+        </p:nvSpPr>
+        <p:spPr/>
+        <p:txBody>
+          <a:bodyPr/>
+          <a:lstStyle/>
+          <a:p>
+            <a:r>
+              <a:rPr lang="en-US" dirty="0" smtClean="0"/>
+              <a:t>Invalid Input for Custom Charts</a:t>
+            </a:r>
+            <a:endParaRPr lang="en-IN" dirty="0"/>
+          </a:p>
+        </p:txBody>
+      </p:sp>
+      <p:sp>
+        <p:nvSpPr>
+          <p:cNvPr id="2" name="Invalid Input"/>
+          <p:cNvSpPr/>
+          <p:nvPr/>
+        </p:nvSpPr>
+        <p:spPr>
+          <a:xfrm>
+            <a:off x="2704010" y="2612571"/>
+            <a:ext cx="2717075" cy="2455818"/>
+          </a:xfrm>
+          <a:prstGeom prst="ellipse">
+            <a:avLst/>
+          </a:prstGeom>
+        </p:spPr>
+        <p:style>
+          <a:lnRef idx="2">
+            <a:schemeClr val="accent1">
+              <a:shade val="50000"/>
+            </a:schemeClr>
+          </a:lnRef>
+          <a:fillRef idx="1">
+            <a:schemeClr val="accent1"/>
+          </a:fillRef>
+          <a:effectRef idx="0">
+            <a:schemeClr val="accent1"/>
+          </a:effectRef>
+          <a:fontRef idx="minor">
+            <a:schemeClr val="lt1"/>
+          </a:fontRef>
+        </p:style>
+        <p:txBody>
+          <a:bodyPr rtlCol="0" anchor="ctr"/>
+          <a:lstStyle/>
+          <a:p>
+            <a:pPr algn="ctr"/>
+            <a:endParaRPr lang="en-IN"/>
+          </a:p>
+        </p:txBody>
+      </p:sp>
+    </p:spTree>
+    <p:extLst>
+      <p:ext uri="{BB962C8B-B14F-4D97-AF65-F5344CB8AC3E}">
+        <p14:creationId xmlns:p14="http://schemas.microsoft.com/office/powerpoint/2010/main" val="2245671832"/>
       </p:ext>
     </p:extLst>
   </p:cSld>
@@ -14806,7 +14889,7 @@
           <p:nvPr>
             <p:extLst>
               <p:ext uri="{D42A27DB-BD31-4B8C-83A1-F6EECF244321}">
-                <p14:modId xmlns:p14="http://schemas.microsoft.com/office/powerpoint/2010/main" val="1276772646"/>
+                <p14:modId xmlns:p14="http://schemas.microsoft.com/office/powerpoint/2010/main" val="1926696467"/>
               </p:ext>
             </p:extLst>
           </p:nvPr>
@@ -14836,6 +14919,11 @@
                     <a:bodyPr/>
                     <a:lstStyle/>
                     <a:p>
+                      <a:pPr algn="ctr"/>
+                      <a:r>
+                        <a:rPr lang="en-IN" sz="1100" dirty="0" smtClean="0"/>
+                        <a:t>column</a:t>
+                      </a:r>
                       <a:endParaRPr lang="en-IN" sz="1100" dirty="0"/>
                     </a:p>
                   </a:txBody>
@@ -14853,6 +14941,11 @@
                     <a:bodyPr/>
                     <a:lstStyle/>
                     <a:p>
+                      <a:pPr algn="ctr"/>
+                      <a:r>
+                        <a:rPr lang="en-IN" sz="1200" dirty="0" smtClean="0"/>
+                        <a:t>row</a:t>
+                      </a:r>
                       <a:endParaRPr lang="en-IN" sz="1200" dirty="0"/>
                     </a:p>
                   </a:txBody>

</xml_diff>